<commit_message>
Made Changes to PPT
</commit_message>
<xml_diff>
--- a/CrimeScene.pptx
+++ b/CrimeScene.pptx
@@ -203,7 +203,7 @@
           <a:p>
             <a:fld id="{6BD8401B-D1DA-4591-AA1C-8E2D8006F925}" type="datetimeFigureOut">
               <a:rPr lang="en-IN" smtClean="0"/>
-              <a:t>17-04-2024</a:t>
+              <a:t>24-04-2024</a:t>
             </a:fld>
             <a:endParaRPr lang="en-IN"/>
           </a:p>
@@ -689,7 +689,7 @@
           <a:p>
             <a:fld id="{EED465B2-3639-49EE-8ADB-3D9D39AAC8D6}" type="datetimeFigureOut">
               <a:rPr lang="en-IN" smtClean="0"/>
-              <a:t>17-04-2024</a:t>
+              <a:t>24-04-2024</a:t>
             </a:fld>
             <a:endParaRPr lang="en-IN"/>
           </a:p>
@@ -859,7 +859,7 @@
           <a:p>
             <a:fld id="{EED465B2-3639-49EE-8ADB-3D9D39AAC8D6}" type="datetimeFigureOut">
               <a:rPr lang="en-IN" smtClean="0"/>
-              <a:t>17-04-2024</a:t>
+              <a:t>24-04-2024</a:t>
             </a:fld>
             <a:endParaRPr lang="en-IN"/>
           </a:p>
@@ -1039,7 +1039,7 @@
           <a:p>
             <a:fld id="{EED465B2-3639-49EE-8ADB-3D9D39AAC8D6}" type="datetimeFigureOut">
               <a:rPr lang="en-IN" smtClean="0"/>
-              <a:t>17-04-2024</a:t>
+              <a:t>24-04-2024</a:t>
             </a:fld>
             <a:endParaRPr lang="en-IN"/>
           </a:p>
@@ -1209,7 +1209,7 @@
           <a:p>
             <a:fld id="{EED465B2-3639-49EE-8ADB-3D9D39AAC8D6}" type="datetimeFigureOut">
               <a:rPr lang="en-IN" smtClean="0"/>
-              <a:t>17-04-2024</a:t>
+              <a:t>24-04-2024</a:t>
             </a:fld>
             <a:endParaRPr lang="en-IN"/>
           </a:p>
@@ -1455,7 +1455,7 @@
           <a:p>
             <a:fld id="{EED465B2-3639-49EE-8ADB-3D9D39AAC8D6}" type="datetimeFigureOut">
               <a:rPr lang="en-IN" smtClean="0"/>
-              <a:t>17-04-2024</a:t>
+              <a:t>24-04-2024</a:t>
             </a:fld>
             <a:endParaRPr lang="en-IN"/>
           </a:p>
@@ -1687,7 +1687,7 @@
           <a:p>
             <a:fld id="{EED465B2-3639-49EE-8ADB-3D9D39AAC8D6}" type="datetimeFigureOut">
               <a:rPr lang="en-IN" smtClean="0"/>
-              <a:t>17-04-2024</a:t>
+              <a:t>24-04-2024</a:t>
             </a:fld>
             <a:endParaRPr lang="en-IN"/>
           </a:p>
@@ -2054,7 +2054,7 @@
           <a:p>
             <a:fld id="{EED465B2-3639-49EE-8ADB-3D9D39AAC8D6}" type="datetimeFigureOut">
               <a:rPr lang="en-IN" smtClean="0"/>
-              <a:t>17-04-2024</a:t>
+              <a:t>24-04-2024</a:t>
             </a:fld>
             <a:endParaRPr lang="en-IN"/>
           </a:p>
@@ -2172,7 +2172,7 @@
           <a:p>
             <a:fld id="{EED465B2-3639-49EE-8ADB-3D9D39AAC8D6}" type="datetimeFigureOut">
               <a:rPr lang="en-IN" smtClean="0"/>
-              <a:t>17-04-2024</a:t>
+              <a:t>24-04-2024</a:t>
             </a:fld>
             <a:endParaRPr lang="en-IN"/>
           </a:p>
@@ -2267,7 +2267,7 @@
           <a:p>
             <a:fld id="{EED465B2-3639-49EE-8ADB-3D9D39AAC8D6}" type="datetimeFigureOut">
               <a:rPr lang="en-IN" smtClean="0"/>
-              <a:t>17-04-2024</a:t>
+              <a:t>24-04-2024</a:t>
             </a:fld>
             <a:endParaRPr lang="en-IN"/>
           </a:p>
@@ -2544,7 +2544,7 @@
           <a:p>
             <a:fld id="{EED465B2-3639-49EE-8ADB-3D9D39AAC8D6}" type="datetimeFigureOut">
               <a:rPr lang="en-IN" smtClean="0"/>
-              <a:t>17-04-2024</a:t>
+              <a:t>24-04-2024</a:t>
             </a:fld>
             <a:endParaRPr lang="en-IN"/>
           </a:p>
@@ -2801,7 +2801,7 @@
           <a:p>
             <a:fld id="{EED465B2-3639-49EE-8ADB-3D9D39AAC8D6}" type="datetimeFigureOut">
               <a:rPr lang="en-IN" smtClean="0"/>
-              <a:t>17-04-2024</a:t>
+              <a:t>24-04-2024</a:t>
             </a:fld>
             <a:endParaRPr lang="en-IN"/>
           </a:p>
@@ -3014,7 +3014,7 @@
           <a:p>
             <a:fld id="{EED465B2-3639-49EE-8ADB-3D9D39AAC8D6}" type="datetimeFigureOut">
               <a:rPr lang="en-IN" smtClean="0"/>
-              <a:t>17-04-2024</a:t>
+              <a:t>24-04-2024</a:t>
             </a:fld>
             <a:endParaRPr lang="en-IN"/>
           </a:p>
@@ -4192,42 +4192,114 @@
           <a:chExt cx="0" cy="0"/>
         </a:xfrm>
       </p:grpSpPr>
-      <p:pic>
-        <p:nvPicPr>
-          <p:cNvPr id="4" name="Picture 3">
+      <p:grpSp>
+        <p:nvGrpSpPr>
+          <p:cNvPr id="5" name="Group 4">
             <a:extLst>
               <a:ext uri="{FF2B5EF4-FFF2-40B4-BE49-F238E27FC236}">
-                <a16:creationId xmlns:a16="http://schemas.microsoft.com/office/drawing/2014/main" id="{1860985B-0D12-C346-D1A4-2688FDC2D81B}"/>
+                <a16:creationId xmlns:a16="http://schemas.microsoft.com/office/drawing/2014/main" id="{AD614306-78C5-7566-97E5-DAAD6B4A486F}"/>
               </a:ext>
             </a:extLst>
           </p:cNvPr>
-          <p:cNvPicPr>
-            <a:picLocks noChangeAspect="1"/>
-          </p:cNvPicPr>
+          <p:cNvGrpSpPr/>
           <p:nvPr/>
-        </p:nvPicPr>
-        <p:blipFill>
-          <a:blip r:embed="rId2">
-            <a:extLst>
-              <a:ext uri="{28A0092B-C50C-407E-A947-70E740481C1C}">
-                <a14:useLocalDpi xmlns:a14="http://schemas.microsoft.com/office/drawing/2010/main" val="0"/>
-              </a:ext>
-            </a:extLst>
-          </a:blip>
-          <a:stretch>
-            <a:fillRect/>
-          </a:stretch>
-        </p:blipFill>
-        <p:spPr>
+        </p:nvGrpSpPr>
+        <p:grpSpPr>
           <a:xfrm>
             <a:off x="1301148" y="267559"/>
             <a:ext cx="9589703" cy="6322881"/>
+            <a:chOff x="1301148" y="267559"/>
+            <a:chExt cx="9589703" cy="6322881"/>
           </a:xfrm>
-          <a:prstGeom prst="rect">
-            <a:avLst/>
-          </a:prstGeom>
-        </p:spPr>
-      </p:pic>
+        </p:grpSpPr>
+        <p:pic>
+          <p:nvPicPr>
+            <p:cNvPr id="4" name="Picture 3">
+              <a:extLst>
+                <a:ext uri="{FF2B5EF4-FFF2-40B4-BE49-F238E27FC236}">
+                  <a16:creationId xmlns:a16="http://schemas.microsoft.com/office/drawing/2014/main" id="{1860985B-0D12-C346-D1A4-2688FDC2D81B}"/>
+                </a:ext>
+              </a:extLst>
+            </p:cNvPr>
+            <p:cNvPicPr>
+              <a:picLocks noChangeAspect="1"/>
+            </p:cNvPicPr>
+            <p:nvPr/>
+          </p:nvPicPr>
+          <p:blipFill>
+            <a:blip r:embed="rId2">
+              <a:extLst>
+                <a:ext uri="{28A0092B-C50C-407E-A947-70E740481C1C}">
+                  <a14:useLocalDpi xmlns:a14="http://schemas.microsoft.com/office/drawing/2010/main" val="0"/>
+                </a:ext>
+              </a:extLst>
+            </a:blip>
+            <a:stretch>
+              <a:fillRect/>
+            </a:stretch>
+          </p:blipFill>
+          <p:spPr>
+            <a:xfrm>
+              <a:off x="1301148" y="267559"/>
+              <a:ext cx="9589703" cy="6322881"/>
+            </a:xfrm>
+            <a:prstGeom prst="rect">
+              <a:avLst/>
+            </a:prstGeom>
+          </p:spPr>
+        </p:pic>
+        <p:sp>
+          <p:nvSpPr>
+            <p:cNvPr id="2" name="Rectangle: Rounded Corners 1">
+              <a:hlinkClick r:id="rId3" action="ppaction://hlinksldjump"/>
+              <a:extLst>
+                <a:ext uri="{FF2B5EF4-FFF2-40B4-BE49-F238E27FC236}">
+                  <a16:creationId xmlns:a16="http://schemas.microsoft.com/office/drawing/2014/main" id="{E991A8DC-CC2C-CE31-F438-A6E95EA80587}"/>
+                </a:ext>
+              </a:extLst>
+            </p:cNvPr>
+            <p:cNvSpPr/>
+            <p:nvPr/>
+          </p:nvSpPr>
+          <p:spPr>
+            <a:xfrm>
+              <a:off x="4343400" y="5093208"/>
+              <a:ext cx="4105656" cy="1170432"/>
+            </a:xfrm>
+            <a:prstGeom prst="roundRect">
+              <a:avLst/>
+            </a:prstGeom>
+            <a:noFill/>
+            <a:ln>
+              <a:noFill/>
+            </a:ln>
+          </p:spPr>
+          <p:style>
+            <a:lnRef idx="2">
+              <a:schemeClr val="accent1">
+                <a:shade val="15000"/>
+              </a:schemeClr>
+            </a:lnRef>
+            <a:fillRef idx="1">
+              <a:schemeClr val="accent1"/>
+            </a:fillRef>
+            <a:effectRef idx="0">
+              <a:schemeClr val="accent1"/>
+            </a:effectRef>
+            <a:fontRef idx="minor">
+              <a:schemeClr val="lt1"/>
+            </a:fontRef>
+          </p:style>
+          <p:txBody>
+            <a:bodyPr rtlCol="0" anchor="ctr"/>
+            <a:lstStyle/>
+            <a:p>
+              <a:pPr algn="ctr"/>
+              <a:endParaRPr lang="en-IN" dirty="0"/>
+            </a:p>
+          </p:txBody>
+        </p:sp>
+      </p:grpSp>
     </p:spTree>
     <p:extLst>
       <p:ext uri="{BB962C8B-B14F-4D97-AF65-F5344CB8AC3E}">
@@ -4273,9 +4345,9 @@
         <p:grpSpPr>
           <a:xfrm>
             <a:off x="1346410" y="262606"/>
-            <a:ext cx="9499180" cy="6363483"/>
+            <a:ext cx="9499180" cy="6479039"/>
             <a:chOff x="1346410" y="262606"/>
-            <a:chExt cx="9499180" cy="6363483"/>
+            <a:chExt cx="9499180" cy="6479039"/>
           </a:xfrm>
         </p:grpSpPr>
         <p:pic>
@@ -4314,42 +4386,10 @@
             </a:prstGeom>
           </p:spPr>
         </p:pic>
-        <p:sp>
-          <p:nvSpPr>
-            <p:cNvPr id="2" name="TextBox 1">
-              <a:hlinkClick r:id="rId3"/>
-              <a:extLst>
-                <a:ext uri="{FF2B5EF4-FFF2-40B4-BE49-F238E27FC236}">
-                  <a16:creationId xmlns:a16="http://schemas.microsoft.com/office/drawing/2014/main" id="{65A31232-3017-4EED-5746-137805CA15DE}"/>
-                </a:ext>
-              </a:extLst>
-            </p:cNvPr>
-            <p:cNvSpPr txBox="1"/>
-            <p:nvPr/>
-          </p:nvSpPr>
-          <p:spPr>
-            <a:xfrm>
-              <a:off x="7173310" y="5218386"/>
-              <a:ext cx="1403131" cy="1300655"/>
-            </a:xfrm>
-            <a:prstGeom prst="rect">
-              <a:avLst/>
-            </a:prstGeom>
-            <a:noFill/>
-          </p:spPr>
-          <p:txBody>
-            <a:bodyPr wrap="square" rtlCol="0">
-              <a:spAutoFit/>
-            </a:bodyPr>
-            <a:lstStyle/>
-            <a:p>
-              <a:endParaRPr lang="en-IN" dirty="0"/>
-            </a:p>
-          </p:txBody>
-        </p:sp>
         <p:pic>
           <p:nvPicPr>
             <p:cNvPr id="4" name="Picture 3">
+              <a:hlinkClick r:id="rId3"/>
               <a:extLst>
                 <a:ext uri="{FF2B5EF4-FFF2-40B4-BE49-F238E27FC236}">
                   <a16:creationId xmlns:a16="http://schemas.microsoft.com/office/drawing/2014/main" id="{5A5C565E-408C-4E67-563B-70F6BC043450}"/>
@@ -4389,9 +4429,9 @@
             </a:stretch>
           </p:blipFill>
           <p:spPr>
-            <a:xfrm rot="1354602">
-              <a:off x="7234566" y="5780767"/>
-              <a:ext cx="845322" cy="845322"/>
+            <a:xfrm rot="3631788">
+              <a:off x="6944077" y="5722824"/>
+              <a:ext cx="1018821" cy="1018821"/>
             </a:xfrm>
             <a:prstGeom prst="rect">
               <a:avLst/>
@@ -4438,10 +4478,10 @@
       </p:grpSpPr>
       <p:grpSp>
         <p:nvGrpSpPr>
-          <p:cNvPr id="10" name="Group 9">
+          <p:cNvPr id="14" name="Group 13">
             <a:extLst>
               <a:ext uri="{FF2B5EF4-FFF2-40B4-BE49-F238E27FC236}">
-                <a16:creationId xmlns:a16="http://schemas.microsoft.com/office/drawing/2014/main" id="{038BC42C-87AF-F519-C32A-40D36DC7BBA3}"/>
+                <a16:creationId xmlns:a16="http://schemas.microsoft.com/office/drawing/2014/main" id="{349263D0-104F-8AC0-EBF1-DE3BE12AAF5D}"/>
               </a:ext>
             </a:extLst>
           </p:cNvPr>
@@ -4458,10 +4498,10 @@
         </p:grpSpPr>
         <p:grpSp>
           <p:nvGrpSpPr>
-            <p:cNvPr id="16" name="Group 15">
+            <p:cNvPr id="10" name="Group 9">
               <a:extLst>
                 <a:ext uri="{FF2B5EF4-FFF2-40B4-BE49-F238E27FC236}">
-                  <a16:creationId xmlns:a16="http://schemas.microsoft.com/office/drawing/2014/main" id="{D28FCF41-DAFF-3193-EF53-15BCB5A31D7F}"/>
+                  <a16:creationId xmlns:a16="http://schemas.microsoft.com/office/drawing/2014/main" id="{038BC42C-87AF-F519-C32A-40D36DC7BBA3}"/>
                 </a:ext>
               </a:extLst>
             </p:cNvPr>
@@ -4476,275 +4516,362 @@
               <a:chExt cx="9791988" cy="6893560"/>
             </a:xfrm>
           </p:grpSpPr>
-          <p:pic>
-            <p:nvPicPr>
-              <p:cNvPr id="3" name="Picture 2">
+          <p:grpSp>
+            <p:nvGrpSpPr>
+              <p:cNvPr id="16" name="Group 15">
                 <a:extLst>
                   <a:ext uri="{FF2B5EF4-FFF2-40B4-BE49-F238E27FC236}">
-                    <a16:creationId xmlns:a16="http://schemas.microsoft.com/office/drawing/2014/main" id="{000486D8-066A-3EBD-BD62-749A7C5ADBDC}"/>
+                    <a16:creationId xmlns:a16="http://schemas.microsoft.com/office/drawing/2014/main" id="{D28FCF41-DAFF-3193-EF53-15BCB5A31D7F}"/>
                   </a:ext>
                 </a:extLst>
               </p:cNvPr>
-              <p:cNvPicPr>
-                <a:picLocks noChangeAspect="1"/>
-              </p:cNvPicPr>
+              <p:cNvGrpSpPr/>
               <p:nvPr/>
-            </p:nvPicPr>
-            <p:blipFill rotWithShape="1">
-              <a:blip r:embed="rId2">
-                <a:extLst>
-                  <a:ext uri="{28A0092B-C50C-407E-A947-70E740481C1C}">
-                    <a14:useLocalDpi xmlns:a14="http://schemas.microsoft.com/office/drawing/2010/main" val="0"/>
-                  </a:ext>
-                </a:extLst>
-              </a:blip>
-              <a:srcRect l="7395" t="12148" r="5773" b="9630"/>
-              <a:stretch/>
-            </p:blipFill>
-            <p:spPr>
+            </p:nvGrpSpPr>
+            <p:grpSpPr>
               <a:xfrm>
                 <a:off x="1200006" y="55880"/>
                 <a:ext cx="9791988" cy="6893560"/>
+                <a:chOff x="1200006" y="55880"/>
+                <a:chExt cx="9791988" cy="6893560"/>
+              </a:xfrm>
+            </p:grpSpPr>
+            <p:pic>
+              <p:nvPicPr>
+                <p:cNvPr id="3" name="Picture 2">
+                  <a:extLst>
+                    <a:ext uri="{FF2B5EF4-FFF2-40B4-BE49-F238E27FC236}">
+                      <a16:creationId xmlns:a16="http://schemas.microsoft.com/office/drawing/2014/main" id="{000486D8-066A-3EBD-BD62-749A7C5ADBDC}"/>
+                    </a:ext>
+                  </a:extLst>
+                </p:cNvPr>
+                <p:cNvPicPr>
+                  <a:picLocks noChangeAspect="1"/>
+                </p:cNvPicPr>
+                <p:nvPr/>
+              </p:nvPicPr>
+              <p:blipFill rotWithShape="1">
+                <a:blip r:embed="rId2">
+                  <a:extLst>
+                    <a:ext uri="{28A0092B-C50C-407E-A947-70E740481C1C}">
+                      <a14:useLocalDpi xmlns:a14="http://schemas.microsoft.com/office/drawing/2010/main" val="0"/>
+                    </a:ext>
+                  </a:extLst>
+                </a:blip>
+                <a:srcRect l="7395" t="12148" r="5773" b="9630"/>
+                <a:stretch/>
+              </p:blipFill>
+              <p:spPr>
+                <a:xfrm>
+                  <a:off x="1200006" y="55880"/>
+                  <a:ext cx="9791988" cy="6893560"/>
+                </a:xfrm>
+                <a:prstGeom prst="rect">
+                  <a:avLst/>
+                </a:prstGeom>
+              </p:spPr>
+            </p:pic>
+            <p:pic>
+              <p:nvPicPr>
+                <p:cNvPr id="4" name="Picture 3">
+                  <a:extLst>
+                    <a:ext uri="{FF2B5EF4-FFF2-40B4-BE49-F238E27FC236}">
+                      <a16:creationId xmlns:a16="http://schemas.microsoft.com/office/drawing/2014/main" id="{1E7ACF2F-7080-385F-9C4D-8DCD6FB7BA83}"/>
+                    </a:ext>
+                  </a:extLst>
+                </p:cNvPr>
+                <p:cNvPicPr>
+                  <a:picLocks noChangeAspect="1"/>
+                </p:cNvPicPr>
+                <p:nvPr/>
+              </p:nvPicPr>
+              <p:blipFill rotWithShape="1">
+                <a:blip r:embed="rId3">
+                  <a:extLst>
+                    <a:ext uri="{BEBA8EAE-BF5A-486C-A8C5-ECC9F3942E4B}">
+                      <a14:imgProps xmlns:a14="http://schemas.microsoft.com/office/drawing/2010/main">
+                        <a14:imgLayer r:embed="rId4">
+                          <a14:imgEffect>
+                            <a14:saturation sat="300000"/>
+                          </a14:imgEffect>
+                        </a14:imgLayer>
+                      </a14:imgProps>
+                    </a:ext>
+                  </a:extLst>
+                </a:blip>
+                <a:srcRect t="4315"/>
+                <a:stretch/>
+              </p:blipFill>
+              <p:spPr>
+                <a:xfrm>
+                  <a:off x="2094278" y="4785360"/>
+                  <a:ext cx="923492" cy="1002792"/>
+                </a:xfrm>
+                <a:prstGeom prst="rect">
+                  <a:avLst/>
+                </a:prstGeom>
+                <a:ln>
+                  <a:solidFill>
+                    <a:schemeClr val="bg1"/>
+                  </a:solidFill>
+                </a:ln>
+              </p:spPr>
+            </p:pic>
+            <p:pic>
+              <p:nvPicPr>
+                <p:cNvPr id="5" name="Picture 4">
+                  <a:extLst>
+                    <a:ext uri="{FF2B5EF4-FFF2-40B4-BE49-F238E27FC236}">
+                      <a16:creationId xmlns:a16="http://schemas.microsoft.com/office/drawing/2014/main" id="{79D8A08C-A07D-D87C-C424-4921DEBEC7B7}"/>
+                    </a:ext>
+                  </a:extLst>
+                </p:cNvPr>
+                <p:cNvPicPr>
+                  <a:picLocks noChangeAspect="1"/>
+                </p:cNvPicPr>
+                <p:nvPr/>
+              </p:nvPicPr>
+              <p:blipFill>
+                <a:blip r:embed="rId5"/>
+                <a:stretch>
+                  <a:fillRect/>
+                </a:stretch>
+              </p:blipFill>
+              <p:spPr>
+                <a:xfrm>
+                  <a:off x="4785317" y="2899970"/>
+                  <a:ext cx="609685" cy="161948"/>
+                </a:xfrm>
+                <a:prstGeom prst="rect">
+                  <a:avLst/>
+                </a:prstGeom>
+              </p:spPr>
+            </p:pic>
+            <p:pic>
+              <p:nvPicPr>
+                <p:cNvPr id="7" name="Picture 6">
+                  <a:extLst>
+                    <a:ext uri="{FF2B5EF4-FFF2-40B4-BE49-F238E27FC236}">
+                      <a16:creationId xmlns:a16="http://schemas.microsoft.com/office/drawing/2014/main" id="{62C9C359-E2B7-EFB1-308A-5735ECAD0B80}"/>
+                    </a:ext>
+                  </a:extLst>
+                </p:cNvPr>
+                <p:cNvPicPr>
+                  <a:picLocks noChangeAspect="1"/>
+                </p:cNvPicPr>
+                <p:nvPr/>
+              </p:nvPicPr>
+              <p:blipFill>
+                <a:blip r:embed="rId5"/>
+                <a:stretch>
+                  <a:fillRect/>
+                </a:stretch>
+              </p:blipFill>
+              <p:spPr>
+                <a:xfrm>
+                  <a:off x="5791157" y="1537514"/>
+                  <a:ext cx="609685" cy="161948"/>
+                </a:xfrm>
+                <a:prstGeom prst="rect">
+                  <a:avLst/>
+                </a:prstGeom>
+              </p:spPr>
+            </p:pic>
+            <p:pic>
+              <p:nvPicPr>
+                <p:cNvPr id="9" name="Picture 8">
+                  <a:extLst>
+                    <a:ext uri="{FF2B5EF4-FFF2-40B4-BE49-F238E27FC236}">
+                      <a16:creationId xmlns:a16="http://schemas.microsoft.com/office/drawing/2014/main" id="{5D9A02E0-4A63-B0CA-2B11-B48463814608}"/>
+                    </a:ext>
+                  </a:extLst>
+                </p:cNvPr>
+                <p:cNvPicPr>
+                  <a:picLocks noChangeAspect="1"/>
+                </p:cNvPicPr>
+                <p:nvPr/>
+              </p:nvPicPr>
+              <p:blipFill>
+                <a:blip r:embed="rId5"/>
+                <a:stretch>
+                  <a:fillRect/>
+                </a:stretch>
+              </p:blipFill>
+              <p:spPr>
+                <a:xfrm>
+                  <a:off x="4175632" y="1504849"/>
+                  <a:ext cx="609685" cy="227278"/>
+                </a:xfrm>
+                <a:prstGeom prst="rect">
+                  <a:avLst/>
+                </a:prstGeom>
+              </p:spPr>
+            </p:pic>
+            <p:pic>
+              <p:nvPicPr>
+                <p:cNvPr id="11" name="Picture 10">
+                  <a:extLst>
+                    <a:ext uri="{FF2B5EF4-FFF2-40B4-BE49-F238E27FC236}">
+                      <a16:creationId xmlns:a16="http://schemas.microsoft.com/office/drawing/2014/main" id="{94F0C2B1-6BFC-0DCA-81E7-A3C1B5F0ECD7}"/>
+                    </a:ext>
+                  </a:extLst>
+                </p:cNvPr>
+                <p:cNvPicPr>
+                  <a:picLocks noChangeAspect="1"/>
+                </p:cNvPicPr>
+                <p:nvPr/>
+              </p:nvPicPr>
+              <p:blipFill>
+                <a:blip r:embed="rId5"/>
+                <a:stretch>
+                  <a:fillRect/>
+                </a:stretch>
+              </p:blipFill>
+              <p:spPr>
+                <a:xfrm>
+                  <a:off x="3367870" y="1486561"/>
+                  <a:ext cx="609685" cy="161948"/>
+                </a:xfrm>
+                <a:prstGeom prst="rect">
+                  <a:avLst/>
+                </a:prstGeom>
+              </p:spPr>
+            </p:pic>
+            <p:pic>
+              <p:nvPicPr>
+                <p:cNvPr id="13" name="Picture 12">
+                  <a:extLst>
+                    <a:ext uri="{FF2B5EF4-FFF2-40B4-BE49-F238E27FC236}">
+                      <a16:creationId xmlns:a16="http://schemas.microsoft.com/office/drawing/2014/main" id="{68D1A2D2-197E-0C81-18AD-F0F66AD59DD2}"/>
+                    </a:ext>
+                  </a:extLst>
+                </p:cNvPr>
+                <p:cNvPicPr>
+                  <a:picLocks noChangeAspect="1"/>
+                </p:cNvPicPr>
+                <p:nvPr/>
+              </p:nvPicPr>
+              <p:blipFill>
+                <a:blip r:embed="rId5"/>
+                <a:stretch>
+                  <a:fillRect/>
+                </a:stretch>
+              </p:blipFill>
+              <p:spPr>
+                <a:xfrm>
+                  <a:off x="3203405" y="1777847"/>
+                  <a:ext cx="609685" cy="161948"/>
+                </a:xfrm>
+                <a:prstGeom prst="rect">
+                  <a:avLst/>
+                </a:prstGeom>
+              </p:spPr>
+            </p:pic>
+            <p:pic>
+              <p:nvPicPr>
+                <p:cNvPr id="15" name="Picture 14">
+                  <a:extLst>
+                    <a:ext uri="{FF2B5EF4-FFF2-40B4-BE49-F238E27FC236}">
+                      <a16:creationId xmlns:a16="http://schemas.microsoft.com/office/drawing/2014/main" id="{FB9B7D0B-617F-7BCD-2BD3-A8875C6D3B78}"/>
+                    </a:ext>
+                  </a:extLst>
+                </p:cNvPr>
+                <p:cNvPicPr>
+                  <a:picLocks noChangeAspect="1"/>
+                </p:cNvPicPr>
+                <p:nvPr/>
+              </p:nvPicPr>
+              <p:blipFill>
+                <a:blip r:embed="rId5"/>
+                <a:stretch>
+                  <a:fillRect/>
+                </a:stretch>
+              </p:blipFill>
+              <p:spPr>
+                <a:xfrm rot="20873398">
+                  <a:off x="5983180" y="2569465"/>
+                  <a:ext cx="649086" cy="172414"/>
+                </a:xfrm>
+                <a:prstGeom prst="rect">
+                  <a:avLst/>
+                </a:prstGeom>
+              </p:spPr>
+            </p:pic>
+          </p:grpSp>
+          <p:sp>
+            <p:nvSpPr>
+              <p:cNvPr id="6" name="TextBox 5">
+                <a:hlinkClick r:id="rId6"/>
+                <a:extLst>
+                  <a:ext uri="{FF2B5EF4-FFF2-40B4-BE49-F238E27FC236}">
+                    <a16:creationId xmlns:a16="http://schemas.microsoft.com/office/drawing/2014/main" id="{42D79FEB-0374-19F2-B378-0BA1DDB580E1}"/>
+                  </a:ext>
+                </a:extLst>
+              </p:cNvPr>
+              <p:cNvSpPr txBox="1"/>
+              <p:nvPr/>
+            </p:nvSpPr>
+            <p:spPr>
+              <a:xfrm>
+                <a:off x="7110247" y="1486560"/>
+                <a:ext cx="1355836" cy="1413410"/>
               </a:xfrm>
               <a:prstGeom prst="rect">
                 <a:avLst/>
               </a:prstGeom>
+              <a:noFill/>
             </p:spPr>
-          </p:pic>
-          <p:pic>
-            <p:nvPicPr>
-              <p:cNvPr id="4" name="Picture 3">
+            <p:txBody>
+              <a:bodyPr wrap="square" rtlCol="0">
+                <a:spAutoFit/>
+              </a:bodyPr>
+              <a:lstStyle/>
+              <a:p>
+                <a:endParaRPr lang="en-IN" dirty="0"/>
+              </a:p>
+            </p:txBody>
+          </p:sp>
+          <p:sp>
+            <p:nvSpPr>
+              <p:cNvPr id="8" name="TextBox 7">
+                <a:hlinkClick r:id="rId7"/>
                 <a:extLst>
                   <a:ext uri="{FF2B5EF4-FFF2-40B4-BE49-F238E27FC236}">
-                    <a16:creationId xmlns:a16="http://schemas.microsoft.com/office/drawing/2014/main" id="{1E7ACF2F-7080-385F-9C4D-8DCD6FB7BA83}"/>
+                    <a16:creationId xmlns:a16="http://schemas.microsoft.com/office/drawing/2014/main" id="{2DBCC0F5-6414-3EA8-9AF7-B70D8F40DC1D}"/>
                   </a:ext>
                 </a:extLst>
               </p:cNvPr>
-              <p:cNvPicPr>
-                <a:picLocks noChangeAspect="1"/>
-              </p:cNvPicPr>
+              <p:cNvSpPr txBox="1"/>
               <p:nvPr/>
-            </p:nvPicPr>
-            <p:blipFill rotWithShape="1">
-              <a:blip r:embed="rId3">
-                <a:extLst>
-                  <a:ext uri="{BEBA8EAE-BF5A-486C-A8C5-ECC9F3942E4B}">
-                    <a14:imgProps xmlns:a14="http://schemas.microsoft.com/office/drawing/2010/main">
-                      <a14:imgLayer r:embed="rId4">
-                        <a14:imgEffect>
-                          <a14:saturation sat="300000"/>
-                        </a14:imgEffect>
-                      </a14:imgLayer>
-                    </a14:imgProps>
-                  </a:ext>
-                </a:extLst>
-              </a:blip>
-              <a:srcRect t="4315"/>
-              <a:stretch/>
-            </p:blipFill>
+            </p:nvSpPr>
             <p:spPr>
               <a:xfrm>
-                <a:off x="2094278" y="4785360"/>
-                <a:ext cx="923492" cy="1002792"/>
+                <a:off x="3192468" y="779856"/>
+                <a:ext cx="3450662" cy="2282062"/>
               </a:xfrm>
               <a:prstGeom prst="rect">
                 <a:avLst/>
               </a:prstGeom>
-              <a:ln>
-                <a:solidFill>
-                  <a:schemeClr val="bg1"/>
-                </a:solidFill>
-              </a:ln>
+              <a:noFill/>
             </p:spPr>
-          </p:pic>
-          <p:pic>
-            <p:nvPicPr>
-              <p:cNvPr id="5" name="Picture 4">
-                <a:extLst>
-                  <a:ext uri="{FF2B5EF4-FFF2-40B4-BE49-F238E27FC236}">
-                    <a16:creationId xmlns:a16="http://schemas.microsoft.com/office/drawing/2014/main" id="{79D8A08C-A07D-D87C-C424-4921DEBEC7B7}"/>
-                  </a:ext>
-                </a:extLst>
-              </p:cNvPr>
-              <p:cNvPicPr>
-                <a:picLocks noChangeAspect="1"/>
-              </p:cNvPicPr>
-              <p:nvPr/>
-            </p:nvPicPr>
-            <p:blipFill>
-              <a:blip r:embed="rId5"/>
-              <a:stretch>
-                <a:fillRect/>
-              </a:stretch>
-            </p:blipFill>
-            <p:spPr>
-              <a:xfrm>
-                <a:off x="4785317" y="2899970"/>
-                <a:ext cx="609685" cy="161948"/>
-              </a:xfrm>
-              <a:prstGeom prst="rect">
-                <a:avLst/>
-              </a:prstGeom>
-            </p:spPr>
-          </p:pic>
-          <p:pic>
-            <p:nvPicPr>
-              <p:cNvPr id="7" name="Picture 6">
-                <a:extLst>
-                  <a:ext uri="{FF2B5EF4-FFF2-40B4-BE49-F238E27FC236}">
-                    <a16:creationId xmlns:a16="http://schemas.microsoft.com/office/drawing/2014/main" id="{62C9C359-E2B7-EFB1-308A-5735ECAD0B80}"/>
-                  </a:ext>
-                </a:extLst>
-              </p:cNvPr>
-              <p:cNvPicPr>
-                <a:picLocks noChangeAspect="1"/>
-              </p:cNvPicPr>
-              <p:nvPr/>
-            </p:nvPicPr>
-            <p:blipFill>
-              <a:blip r:embed="rId5"/>
-              <a:stretch>
-                <a:fillRect/>
-              </a:stretch>
-            </p:blipFill>
-            <p:spPr>
-              <a:xfrm>
-                <a:off x="5791157" y="1537514"/>
-                <a:ext cx="609685" cy="161948"/>
-              </a:xfrm>
-              <a:prstGeom prst="rect">
-                <a:avLst/>
-              </a:prstGeom>
-            </p:spPr>
-          </p:pic>
-          <p:pic>
-            <p:nvPicPr>
-              <p:cNvPr id="9" name="Picture 8">
-                <a:extLst>
-                  <a:ext uri="{FF2B5EF4-FFF2-40B4-BE49-F238E27FC236}">
-                    <a16:creationId xmlns:a16="http://schemas.microsoft.com/office/drawing/2014/main" id="{5D9A02E0-4A63-B0CA-2B11-B48463814608}"/>
-                  </a:ext>
-                </a:extLst>
-              </p:cNvPr>
-              <p:cNvPicPr>
-                <a:picLocks noChangeAspect="1"/>
-              </p:cNvPicPr>
-              <p:nvPr/>
-            </p:nvPicPr>
-            <p:blipFill>
-              <a:blip r:embed="rId5"/>
-              <a:stretch>
-                <a:fillRect/>
-              </a:stretch>
-            </p:blipFill>
-            <p:spPr>
-              <a:xfrm>
-                <a:off x="4175632" y="1504849"/>
-                <a:ext cx="609685" cy="227278"/>
-              </a:xfrm>
-              <a:prstGeom prst="rect">
-                <a:avLst/>
-              </a:prstGeom>
-            </p:spPr>
-          </p:pic>
-          <p:pic>
-            <p:nvPicPr>
-              <p:cNvPr id="11" name="Picture 10">
-                <a:extLst>
-                  <a:ext uri="{FF2B5EF4-FFF2-40B4-BE49-F238E27FC236}">
-                    <a16:creationId xmlns:a16="http://schemas.microsoft.com/office/drawing/2014/main" id="{94F0C2B1-6BFC-0DCA-81E7-A3C1B5F0ECD7}"/>
-                  </a:ext>
-                </a:extLst>
-              </p:cNvPr>
-              <p:cNvPicPr>
-                <a:picLocks noChangeAspect="1"/>
-              </p:cNvPicPr>
-              <p:nvPr/>
-            </p:nvPicPr>
-            <p:blipFill>
-              <a:blip r:embed="rId5"/>
-              <a:stretch>
-                <a:fillRect/>
-              </a:stretch>
-            </p:blipFill>
-            <p:spPr>
-              <a:xfrm>
-                <a:off x="3367870" y="1486561"/>
-                <a:ext cx="609685" cy="161948"/>
-              </a:xfrm>
-              <a:prstGeom prst="rect">
-                <a:avLst/>
-              </a:prstGeom>
-            </p:spPr>
-          </p:pic>
-          <p:pic>
-            <p:nvPicPr>
-              <p:cNvPr id="13" name="Picture 12">
-                <a:extLst>
-                  <a:ext uri="{FF2B5EF4-FFF2-40B4-BE49-F238E27FC236}">
-                    <a16:creationId xmlns:a16="http://schemas.microsoft.com/office/drawing/2014/main" id="{68D1A2D2-197E-0C81-18AD-F0F66AD59DD2}"/>
-                  </a:ext>
-                </a:extLst>
-              </p:cNvPr>
-              <p:cNvPicPr>
-                <a:picLocks noChangeAspect="1"/>
-              </p:cNvPicPr>
-              <p:nvPr/>
-            </p:nvPicPr>
-            <p:blipFill>
-              <a:blip r:embed="rId5"/>
-              <a:stretch>
-                <a:fillRect/>
-              </a:stretch>
-            </p:blipFill>
-            <p:spPr>
-              <a:xfrm>
-                <a:off x="3203405" y="1777847"/>
-                <a:ext cx="609685" cy="161948"/>
-              </a:xfrm>
-              <a:prstGeom prst="rect">
-                <a:avLst/>
-              </a:prstGeom>
-            </p:spPr>
-          </p:pic>
-          <p:pic>
-            <p:nvPicPr>
-              <p:cNvPr id="15" name="Picture 14">
-                <a:extLst>
-                  <a:ext uri="{FF2B5EF4-FFF2-40B4-BE49-F238E27FC236}">
-                    <a16:creationId xmlns:a16="http://schemas.microsoft.com/office/drawing/2014/main" id="{FB9B7D0B-617F-7BCD-2BD3-A8875C6D3B78}"/>
-                  </a:ext>
-                </a:extLst>
-              </p:cNvPr>
-              <p:cNvPicPr>
-                <a:picLocks noChangeAspect="1"/>
-              </p:cNvPicPr>
-              <p:nvPr/>
-            </p:nvPicPr>
-            <p:blipFill>
-              <a:blip r:embed="rId5"/>
-              <a:stretch>
-                <a:fillRect/>
-              </a:stretch>
-            </p:blipFill>
-            <p:spPr>
-              <a:xfrm rot="20873398">
-                <a:off x="5983180" y="2569465"/>
-                <a:ext cx="649086" cy="172414"/>
-              </a:xfrm>
-              <a:prstGeom prst="rect">
-                <a:avLst/>
-              </a:prstGeom>
-            </p:spPr>
-          </p:pic>
+            <p:txBody>
+              <a:bodyPr wrap="square" rtlCol="0">
+                <a:spAutoFit/>
+              </a:bodyPr>
+              <a:lstStyle/>
+              <a:p>
+                <a:endParaRPr lang="en-IN" dirty="0"/>
+              </a:p>
+            </p:txBody>
+          </p:sp>
         </p:grpSp>
         <p:sp>
           <p:nvSpPr>
-            <p:cNvPr id="6" name="TextBox 5">
-              <a:hlinkClick r:id="rId6"/>
+            <p:cNvPr id="12" name="TextBox 11">
+              <a:hlinkClick r:id="rId8"/>
               <a:extLst>
                 <a:ext uri="{FF2B5EF4-FFF2-40B4-BE49-F238E27FC236}">
-                  <a16:creationId xmlns:a16="http://schemas.microsoft.com/office/drawing/2014/main" id="{42D79FEB-0374-19F2-B378-0BA1DDB580E1}"/>
+                  <a16:creationId xmlns:a16="http://schemas.microsoft.com/office/drawing/2014/main" id="{4B5EB217-3023-4F61-A2B3-340572C0A8A2}"/>
                 </a:ext>
               </a:extLst>
             </p:cNvPr>
@@ -4753,46 +4880,16 @@
           </p:nvSpPr>
           <p:spPr>
             <a:xfrm>
-              <a:off x="7110247" y="1486560"/>
-              <a:ext cx="1355836" cy="1413410"/>
+              <a:off x="2094278" y="4785360"/>
+              <a:ext cx="923492" cy="1002792"/>
             </a:xfrm>
             <a:prstGeom prst="rect">
               <a:avLst/>
             </a:prstGeom>
             <a:noFill/>
-          </p:spPr>
-          <p:txBody>
-            <a:bodyPr wrap="square" rtlCol="0">
-              <a:spAutoFit/>
-            </a:bodyPr>
-            <a:lstStyle/>
-            <a:p>
-              <a:endParaRPr lang="en-IN" dirty="0"/>
-            </a:p>
-          </p:txBody>
-        </p:sp>
-        <p:sp>
-          <p:nvSpPr>
-            <p:cNvPr id="8" name="TextBox 7">
-              <a:hlinkClick r:id="rId7"/>
-              <a:extLst>
-                <a:ext uri="{FF2B5EF4-FFF2-40B4-BE49-F238E27FC236}">
-                  <a16:creationId xmlns:a16="http://schemas.microsoft.com/office/drawing/2014/main" id="{2DBCC0F5-6414-3EA8-9AF7-B70D8F40DC1D}"/>
-                </a:ext>
-              </a:extLst>
-            </p:cNvPr>
-            <p:cNvSpPr txBox="1"/>
-            <p:nvPr/>
-          </p:nvSpPr>
-          <p:spPr>
-            <a:xfrm>
-              <a:off x="3192468" y="779856"/>
-              <a:ext cx="3450662" cy="2282062"/>
-            </a:xfrm>
-            <a:prstGeom prst="rect">
-              <a:avLst/>
-            </a:prstGeom>
-            <a:noFill/>
+            <a:ln>
+              <a:noFill/>
+            </a:ln>
           </p:spPr>
           <p:txBody>
             <a:bodyPr wrap="square" rtlCol="0">
@@ -4805,40 +4902,6 @@
           </p:txBody>
         </p:sp>
       </p:grpSp>
-      <p:sp>
-        <p:nvSpPr>
-          <p:cNvPr id="12" name="TextBox 11">
-            <a:extLst>
-              <a:ext uri="{FF2B5EF4-FFF2-40B4-BE49-F238E27FC236}">
-                <a16:creationId xmlns:a16="http://schemas.microsoft.com/office/drawing/2014/main" id="{4B5EB217-3023-4F61-A2B3-340572C0A8A2}"/>
-              </a:ext>
-            </a:extLst>
-          </p:cNvPr>
-          <p:cNvSpPr txBox="1"/>
-          <p:nvPr/>
-        </p:nvSpPr>
-        <p:spPr>
-          <a:xfrm>
-            <a:off x="2094278" y="4785360"/>
-            <a:ext cx="923492" cy="1002792"/>
-          </a:xfrm>
-          <a:prstGeom prst="rect">
-            <a:avLst/>
-          </a:prstGeom>
-          <a:solidFill>
-            <a:schemeClr val="accent2"/>
-          </a:solidFill>
-        </p:spPr>
-        <p:txBody>
-          <a:bodyPr wrap="square" rtlCol="0">
-            <a:spAutoFit/>
-          </a:bodyPr>
-          <a:lstStyle/>
-          <a:p>
-            <a:endParaRPr lang="en-IN" dirty="0"/>
-          </a:p>
-        </p:txBody>
-      </p:sp>
     </p:spTree>
     <p:extLst>
       <p:ext uri="{BB962C8B-B14F-4D97-AF65-F5344CB8AC3E}">

</xml_diff>